<commit_message>
agregado de registro en la aplicacion
</commit_message>
<xml_diff>
--- a/Evidencia5.pptx
+++ b/Evidencia5.pptx
@@ -243,7 +243,7 @@
           <a:p>
             <a:fld id="{6384798C-91DC-4790-9F0F-4A6B153B4E8D}" type="datetimeFigureOut">
               <a:rPr lang="es-AR" smtClean="0"/>
-              <a:t>3/6/2023</a:t>
+              <a:t>5/6/2023</a:t>
             </a:fld>
             <a:endParaRPr lang="es-AR"/>
           </a:p>
@@ -413,7 +413,7 @@
           <a:p>
             <a:fld id="{6384798C-91DC-4790-9F0F-4A6B153B4E8D}" type="datetimeFigureOut">
               <a:rPr lang="es-AR" smtClean="0"/>
-              <a:t>3/6/2023</a:t>
+              <a:t>5/6/2023</a:t>
             </a:fld>
             <a:endParaRPr lang="es-AR"/>
           </a:p>
@@ -593,7 +593,7 @@
           <a:p>
             <a:fld id="{6384798C-91DC-4790-9F0F-4A6B153B4E8D}" type="datetimeFigureOut">
               <a:rPr lang="es-AR" smtClean="0"/>
-              <a:t>3/6/2023</a:t>
+              <a:t>5/6/2023</a:t>
             </a:fld>
             <a:endParaRPr lang="es-AR"/>
           </a:p>
@@ -763,7 +763,7 @@
           <a:p>
             <a:fld id="{6384798C-91DC-4790-9F0F-4A6B153B4E8D}" type="datetimeFigureOut">
               <a:rPr lang="es-AR" smtClean="0"/>
-              <a:t>3/6/2023</a:t>
+              <a:t>5/6/2023</a:t>
             </a:fld>
             <a:endParaRPr lang="es-AR"/>
           </a:p>
@@ -1009,7 +1009,7 @@
           <a:p>
             <a:fld id="{6384798C-91DC-4790-9F0F-4A6B153B4E8D}" type="datetimeFigureOut">
               <a:rPr lang="es-AR" smtClean="0"/>
-              <a:t>3/6/2023</a:t>
+              <a:t>5/6/2023</a:t>
             </a:fld>
             <a:endParaRPr lang="es-AR"/>
           </a:p>
@@ -1241,7 +1241,7 @@
           <a:p>
             <a:fld id="{6384798C-91DC-4790-9F0F-4A6B153B4E8D}" type="datetimeFigureOut">
               <a:rPr lang="es-AR" smtClean="0"/>
-              <a:t>3/6/2023</a:t>
+              <a:t>5/6/2023</a:t>
             </a:fld>
             <a:endParaRPr lang="es-AR"/>
           </a:p>
@@ -1608,7 +1608,7 @@
           <a:p>
             <a:fld id="{6384798C-91DC-4790-9F0F-4A6B153B4E8D}" type="datetimeFigureOut">
               <a:rPr lang="es-AR" smtClean="0"/>
-              <a:t>3/6/2023</a:t>
+              <a:t>5/6/2023</a:t>
             </a:fld>
             <a:endParaRPr lang="es-AR"/>
           </a:p>
@@ -1726,7 +1726,7 @@
           <a:p>
             <a:fld id="{6384798C-91DC-4790-9F0F-4A6B153B4E8D}" type="datetimeFigureOut">
               <a:rPr lang="es-AR" smtClean="0"/>
-              <a:t>3/6/2023</a:t>
+              <a:t>5/6/2023</a:t>
             </a:fld>
             <a:endParaRPr lang="es-AR"/>
           </a:p>
@@ -1821,7 +1821,7 @@
           <a:p>
             <a:fld id="{6384798C-91DC-4790-9F0F-4A6B153B4E8D}" type="datetimeFigureOut">
               <a:rPr lang="es-AR" smtClean="0"/>
-              <a:t>3/6/2023</a:t>
+              <a:t>5/6/2023</a:t>
             </a:fld>
             <a:endParaRPr lang="es-AR"/>
           </a:p>
@@ -2098,7 +2098,7 @@
           <a:p>
             <a:fld id="{6384798C-91DC-4790-9F0F-4A6B153B4E8D}" type="datetimeFigureOut">
               <a:rPr lang="es-AR" smtClean="0"/>
-              <a:t>3/6/2023</a:t>
+              <a:t>5/6/2023</a:t>
             </a:fld>
             <a:endParaRPr lang="es-AR"/>
           </a:p>
@@ -2351,7 +2351,7 @@
           <a:p>
             <a:fld id="{6384798C-91DC-4790-9F0F-4A6B153B4E8D}" type="datetimeFigureOut">
               <a:rPr lang="es-AR" smtClean="0"/>
-              <a:t>3/6/2023</a:t>
+              <a:t>5/6/2023</a:t>
             </a:fld>
             <a:endParaRPr lang="es-AR"/>
           </a:p>
@@ -2564,7 +2564,7 @@
           <a:p>
             <a:fld id="{6384798C-91DC-4790-9F0F-4A6B153B4E8D}" type="datetimeFigureOut">
               <a:rPr lang="es-AR" smtClean="0"/>
-              <a:t>3/6/2023</a:t>
+              <a:t>5/6/2023</a:t>
             </a:fld>
             <a:endParaRPr lang="es-AR"/>
           </a:p>
@@ -2997,16 +2997,7 @@
                 </a:solidFill>
                 <a:effectLst/>
               </a:rPr>
-              <a:t>App convertidor de </a:t>
-            </a:r>
-            <a:r>
-              <a:rPr lang="es-AR" sz="2800" b="1" i="0" u="none" strike="noStrike" dirty="0" smtClean="0">
-                <a:solidFill>
-                  <a:srgbClr val="1C1C1A"/>
-                </a:solidFill>
-                <a:effectLst/>
-              </a:rPr>
-              <a:t>unidades </a:t>
+              <a:t>App convertidor de unidades </a:t>
             </a:r>
             <a:r>
               <a:rPr lang="es-AR" sz="2800" b="1" dirty="0">
@@ -3093,13 +3084,8 @@
           <a:p>
             <a:r>
               <a:rPr lang="es-AR" sz="1700" b="1" dirty="0" smtClean="0"/>
-              <a:t>Segmentos de </a:t>
-            </a:r>
-            <a:r>
-              <a:rPr lang="es-AR" sz="1700" b="1" dirty="0" smtClean="0"/>
-              <a:t>clientes:</a:t>
-            </a:r>
-            <a:endParaRPr lang="es-AR" sz="1700" b="1" dirty="0" smtClean="0"/>
+              <a:t>Segmentos de clientes:</a:t>
+            </a:r>
           </a:p>
           <a:p>
             <a:r>
@@ -3212,7 +3198,6 @@
               <a:rPr lang="es-AR" b="1" dirty="0" smtClean="0"/>
               <a:t>:</a:t>
             </a:r>
-            <a:endParaRPr lang="es-AR" b="1" dirty="0" smtClean="0"/>
           </a:p>
           <a:p>
             <a:r>
@@ -3239,15 +3224,7 @@
             </a:pPr>
             <a:r>
               <a:rPr lang="es-AR" sz="1200" dirty="0" smtClean="0"/>
-              <a:t>Capital inicial para </a:t>
-            </a:r>
-            <a:r>
-              <a:rPr lang="es-AR" sz="1200" dirty="0" smtClean="0"/>
-              <a:t>pagos programadores, publicidad y hosting</a:t>
-            </a:r>
-            <a:r>
-              <a:rPr lang="es-AR" sz="1200" dirty="0" smtClean="0"/>
-              <a:t>.</a:t>
+              <a:t>Capital inicial para pagos programadores, publicidad y hosting.</a:t>
             </a:r>
           </a:p>
           <a:p>
@@ -3865,6 +3842,52 @@
           </a:prstGeom>
         </p:spPr>
       </p:pic>
+      <p:sp>
+        <p:nvSpPr>
+          <p:cNvPr id="7" name="Rectángulo redondeado 6">
+            <a:hlinkClick r:id="rId4"/>
+          </p:cNvPr>
+          <p:cNvSpPr/>
+          <p:nvPr/>
+        </p:nvSpPr>
+        <p:spPr>
+          <a:xfrm>
+            <a:off x="199506" y="6569254"/>
+            <a:ext cx="1305098" cy="232983"/>
+          </a:xfrm>
+          <a:prstGeom prst="roundRect">
+            <a:avLst/>
+          </a:prstGeom>
+        </p:spPr>
+        <p:style>
+          <a:lnRef idx="2">
+            <a:schemeClr val="accent1">
+              <a:shade val="50000"/>
+            </a:schemeClr>
+          </a:lnRef>
+          <a:fillRef idx="1">
+            <a:schemeClr val="accent1"/>
+          </a:fillRef>
+          <a:effectRef idx="0">
+            <a:schemeClr val="accent1"/>
+          </a:effectRef>
+          <a:fontRef idx="minor">
+            <a:schemeClr val="lt1"/>
+          </a:fontRef>
+        </p:style>
+        <p:txBody>
+          <a:bodyPr rtlCol="0" anchor="ctr"/>
+          <a:lstStyle/>
+          <a:p>
+            <a:pPr algn="ctr"/>
+            <a:r>
+              <a:rPr lang="es-AR" sz="1200" dirty="0" smtClean="0"/>
+              <a:t>Ver video Demo</a:t>
+            </a:r>
+            <a:endParaRPr lang="es-AR" sz="1200" dirty="0"/>
+          </a:p>
+        </p:txBody>
+      </p:sp>
     </p:spTree>
     <p:extLst>
       <p:ext uri="{BB962C8B-B14F-4D97-AF65-F5344CB8AC3E}">
@@ -3875,6 +3898,13 @@
   <p:clrMapOvr>
     <a:masterClrMapping/>
   </p:clrMapOvr>
+  <p:timing>
+    <p:tnLst>
+      <p:par>
+        <p:cTn id="1" dur="indefinite" restart="never" nodeType="tmRoot"/>
+      </p:par>
+    </p:tnLst>
+  </p:timing>
 </p:sld>
 </file>
 

</xml_diff>